<commit_message>
Project Presentation - PPTX & PDF
</commit_message>
<xml_diff>
--- a/Slide Show/Presentation_Final_Project_Team_Wine.pptx
+++ b/Slide Show/Presentation_Final_Project_Team_Wine.pptx
@@ -226,7 +226,7 @@
           <a:p>
             <a:fld id="{859D5C6D-3C15-456B-A5C6-E89995BC2C62}" type="datetimeFigureOut">
               <a:rPr lang="en-US" smtClean="0"/>
-              <a:t>2/24/2020</a:t>
+              <a:t>2/25/2020</a:t>
             </a:fld>
             <a:endParaRPr lang="en-US"/>
           </a:p>
@@ -856,7 +856,7 @@
             <a:fld id="{87DE6118-2437-4B30-8E3C-4D2BE6020583}" type="datetimeFigureOut">
               <a:rPr lang="en-US" smtClean="0"/>
               <a:pPr/>
-              <a:t>2/24/2020</a:t>
+              <a:t>2/25/2020</a:t>
             </a:fld>
             <a:endParaRPr lang="en-US" dirty="0"/>
           </a:p>
@@ -1415,7 +1415,7 @@
             <a:fld id="{87DE6118-2437-4B30-8E3C-4D2BE6020583}" type="datetimeFigureOut">
               <a:rPr lang="en-US" smtClean="0"/>
               <a:pPr/>
-              <a:t>2/24/2020</a:t>
+              <a:t>2/25/2020</a:t>
             </a:fld>
             <a:endParaRPr lang="en-US" dirty="0"/>
           </a:p>
@@ -1898,7 +1898,7 @@
             <a:fld id="{87DE6118-2437-4B30-8E3C-4D2BE6020583}" type="datetimeFigureOut">
               <a:rPr lang="en-US" smtClean="0"/>
               <a:pPr/>
-              <a:t>2/24/2020</a:t>
+              <a:t>2/25/2020</a:t>
             </a:fld>
             <a:endParaRPr lang="en-US" dirty="0"/>
           </a:p>
@@ -2176,7 +2176,7 @@
           <a:p>
             <a:fld id="{87DE6118-2437-4B30-8E3C-4D2BE6020583}" type="datetimeFigureOut">
               <a:rPr lang="en-US" smtClean="0"/>
-              <a:t>2/24/2020</a:t>
+              <a:t>2/25/2020</a:t>
             </a:fld>
             <a:endParaRPr lang="en-US" dirty="0"/>
           </a:p>
@@ -2356,7 +2356,7 @@
           <a:p>
             <a:fld id="{87DE6118-2437-4B30-8E3C-4D2BE6020583}" type="datetimeFigureOut">
               <a:rPr lang="en-US" smtClean="0"/>
-              <a:t>2/24/2020</a:t>
+              <a:t>2/25/2020</a:t>
             </a:fld>
             <a:endParaRPr lang="en-US" dirty="0"/>
           </a:p>
@@ -2644,7 +2644,7 @@
             <a:fld id="{87DE6118-2437-4B30-8E3C-4D2BE6020583}" type="datetimeFigureOut">
               <a:rPr lang="en-US" smtClean="0"/>
               <a:pPr/>
-              <a:t>2/24/2020</a:t>
+              <a:t>2/25/2020</a:t>
             </a:fld>
             <a:endParaRPr lang="en-US" dirty="0"/>
           </a:p>
@@ -2961,7 +2961,7 @@
           <a:p>
             <a:fld id="{87DE6118-2437-4B30-8E3C-4D2BE6020583}" type="datetimeFigureOut">
               <a:rPr lang="en-US" smtClean="0"/>
-              <a:t>2/24/2020</a:t>
+              <a:t>2/25/2020</a:t>
             </a:fld>
             <a:endParaRPr lang="en-US" dirty="0"/>
           </a:p>
@@ -3239,7 +3239,7 @@
             <a:fld id="{87DE6118-2437-4B30-8E3C-4D2BE6020583}" type="datetimeFigureOut">
               <a:rPr lang="en-US" smtClean="0"/>
               <a:pPr/>
-              <a:t>2/24/2020</a:t>
+              <a:t>2/25/2020</a:t>
             </a:fld>
             <a:endParaRPr lang="en-US" dirty="0"/>
           </a:p>
@@ -3690,7 +3690,7 @@
           <a:p>
             <a:fld id="{87DE6118-2437-4B30-8E3C-4D2BE6020583}" type="datetimeFigureOut">
               <a:rPr lang="en-US" smtClean="0"/>
-              <a:t>2/24/2020</a:t>
+              <a:t>2/25/2020</a:t>
             </a:fld>
             <a:endParaRPr lang="en-US" dirty="0"/>
           </a:p>
@@ -4167,7 +4167,7 @@
           <a:p>
             <a:fld id="{87DE6118-2437-4B30-8E3C-4D2BE6020583}" type="datetimeFigureOut">
               <a:rPr lang="en-US" smtClean="0"/>
-              <a:t>2/24/2020</a:t>
+              <a:t>2/25/2020</a:t>
             </a:fld>
             <a:endParaRPr lang="en-US" dirty="0"/>
           </a:p>
@@ -4285,7 +4285,7 @@
           <a:p>
             <a:fld id="{87DE6118-2437-4B30-8E3C-4D2BE6020583}" type="datetimeFigureOut">
               <a:rPr lang="en-US" smtClean="0"/>
-              <a:t>2/24/2020</a:t>
+              <a:t>2/25/2020</a:t>
             </a:fld>
             <a:endParaRPr lang="en-US" dirty="0"/>
           </a:p>
@@ -4446,7 +4446,7 @@
           <a:p>
             <a:fld id="{87DE6118-2437-4B30-8E3C-4D2BE6020583}" type="datetimeFigureOut">
               <a:rPr lang="en-US" smtClean="0"/>
-              <a:t>2/24/2020</a:t>
+              <a:t>2/25/2020</a:t>
             </a:fld>
             <a:endParaRPr lang="en-US" dirty="0"/>
           </a:p>
@@ -4541,7 +4541,7 @@
           <a:p>
             <a:fld id="{87DE6118-2437-4B30-8E3C-4D2BE6020583}" type="datetimeFigureOut">
               <a:rPr lang="en-US" smtClean="0"/>
-              <a:t>2/24/2020</a:t>
+              <a:t>2/25/2020</a:t>
             </a:fld>
             <a:endParaRPr lang="en-US" dirty="0"/>
           </a:p>
@@ -4890,7 +4890,7 @@
             <a:fld id="{87DE6118-2437-4B30-8E3C-4D2BE6020583}" type="datetimeFigureOut">
               <a:rPr lang="en-US" smtClean="0"/>
               <a:pPr/>
-              <a:t>2/24/2020</a:t>
+              <a:t>2/25/2020</a:t>
             </a:fld>
             <a:endParaRPr lang="en-US" dirty="0"/>
           </a:p>
@@ -5322,7 +5322,7 @@
             <a:fld id="{87DE6118-2437-4B30-8E3C-4D2BE6020583}" type="datetimeFigureOut">
               <a:rPr lang="en-US" smtClean="0"/>
               <a:pPr/>
-              <a:t>2/24/2020</a:t>
+              <a:t>2/25/2020</a:t>
             </a:fld>
             <a:endParaRPr lang="en-US" dirty="0"/>
           </a:p>
@@ -5600,7 +5600,7 @@
           <a:p>
             <a:fld id="{87DE6118-2437-4B30-8E3C-4D2BE6020583}" type="datetimeFigureOut">
               <a:rPr lang="en-US" smtClean="0"/>
-              <a:t>2/24/2020</a:t>
+              <a:t>2/25/2020</a:t>
             </a:fld>
             <a:endParaRPr lang="en-US" dirty="0"/>
           </a:p>
@@ -5780,7 +5780,7 @@
           <a:p>
             <a:fld id="{87DE6118-2437-4B30-8E3C-4D2BE6020583}" type="datetimeFigureOut">
               <a:rPr lang="en-US" smtClean="0"/>
-              <a:t>2/24/2020</a:t>
+              <a:t>2/25/2020</a:t>
             </a:fld>
             <a:endParaRPr lang="en-US" dirty="0"/>
           </a:p>
@@ -6058,7 +6058,7 @@
             <a:fld id="{87DE6118-2437-4B30-8E3C-4D2BE6020583}" type="datetimeFigureOut">
               <a:rPr lang="en-US" smtClean="0"/>
               <a:pPr/>
-              <a:t>2/24/2020</a:t>
+              <a:t>2/25/2020</a:t>
             </a:fld>
             <a:endParaRPr lang="en-US" dirty="0"/>
           </a:p>
@@ -6327,7 +6327,7 @@
             <a:fld id="{87DE6118-2437-4B30-8E3C-4D2BE6020583}" type="datetimeFigureOut">
               <a:rPr lang="en-US" smtClean="0"/>
               <a:pPr/>
-              <a:t>2/24/2020</a:t>
+              <a:t>2/25/2020</a:t>
             </a:fld>
             <a:endParaRPr lang="en-US" dirty="0"/>
           </a:p>
@@ -6465,7 +6465,7 @@
           <a:p>
             <a:fld id="{87DE6118-2437-4B30-8E3C-4D2BE6020583}" type="datetimeFigureOut">
               <a:rPr lang="en-US" smtClean="0"/>
-              <a:t>2/24/2020</a:t>
+              <a:t>2/25/2020</a:t>
             </a:fld>
             <a:endParaRPr lang="en-US" dirty="0"/>
           </a:p>
@@ -7231,7 +7231,7 @@
           <a:p>
             <a:fld id="{87DE6118-2437-4B30-8E3C-4D2BE6020583}" type="datetimeFigureOut">
               <a:rPr lang="en-US" smtClean="0"/>
-              <a:t>2/24/2020</a:t>
+              <a:t>2/25/2020</a:t>
             </a:fld>
             <a:endParaRPr lang="en-US" dirty="0"/>
           </a:p>
@@ -7707,7 +7707,7 @@
           <a:p>
             <a:fld id="{87DE6118-2437-4B30-8E3C-4D2BE6020583}" type="datetimeFigureOut">
               <a:rPr lang="en-US" smtClean="0"/>
-              <a:t>2/24/2020</a:t>
+              <a:t>2/25/2020</a:t>
             </a:fld>
             <a:endParaRPr lang="en-US" dirty="0"/>
           </a:p>
@@ -7825,7 +7825,7 @@
           <a:p>
             <a:fld id="{87DE6118-2437-4B30-8E3C-4D2BE6020583}" type="datetimeFigureOut">
               <a:rPr lang="en-US" smtClean="0"/>
-              <a:t>2/24/2020</a:t>
+              <a:t>2/25/2020</a:t>
             </a:fld>
             <a:endParaRPr lang="en-US" dirty="0"/>
           </a:p>
@@ -7920,7 +7920,7 @@
           <a:p>
             <a:fld id="{87DE6118-2437-4B30-8E3C-4D2BE6020583}" type="datetimeFigureOut">
               <a:rPr lang="en-US" smtClean="0"/>
-              <a:t>2/24/2020</a:t>
+              <a:t>2/25/2020</a:t>
             </a:fld>
             <a:endParaRPr lang="en-US" dirty="0"/>
           </a:p>
@@ -8187,7 +8187,7 @@
             <a:fld id="{87DE6118-2437-4B30-8E3C-4D2BE6020583}" type="datetimeFigureOut">
               <a:rPr lang="en-US" smtClean="0"/>
               <a:pPr/>
-              <a:t>2/24/2020</a:t>
+              <a:t>2/25/2020</a:t>
             </a:fld>
             <a:endParaRPr lang="en-US" dirty="0"/>
           </a:p>
@@ -8946,7 +8946,7 @@
             <a:fld id="{87DE6118-2437-4B30-8E3C-4D2BE6020583}" type="datetimeFigureOut">
               <a:rPr lang="en-US" smtClean="0"/>
               <a:pPr/>
-              <a:t>2/24/2020</a:t>
+              <a:t>2/25/2020</a:t>
             </a:fld>
             <a:endParaRPr lang="en-US" dirty="0"/>
           </a:p>
@@ -12001,7 +12001,21 @@
                 <a:latin typeface="Calibri" panose="020F0502020204030204" pitchFamily="34" charset="0"/>
                 <a:cs typeface="Calibri" panose="020F0502020204030204" pitchFamily="34" charset="0"/>
               </a:rPr>
-              <a:t> to improve our accuracy.  Randomized Search &amp; </a:t>
+              <a:t> to improve our accuracy.  </a:t>
+            </a:r>
+            <a:r>
+              <a:rPr lang="en-US" dirty="0" err="1">
+                <a:latin typeface="Calibri" panose="020F0502020204030204" pitchFamily="34" charset="0"/>
+                <a:cs typeface="Calibri" panose="020F0502020204030204" pitchFamily="34" charset="0"/>
+              </a:rPr>
+              <a:t>RandomizedSearch</a:t>
+            </a:r>
+            <a:r>
+              <a:rPr lang="en-US" dirty="0">
+                <a:latin typeface="Calibri" panose="020F0502020204030204" pitchFamily="34" charset="0"/>
+                <a:cs typeface="Calibri" panose="020F0502020204030204" pitchFamily="34" charset="0"/>
+              </a:rPr>
+              <a:t> &amp; </a:t>
             </a:r>
             <a:r>
               <a:rPr lang="en-US" dirty="0" err="1">
@@ -12052,7 +12066,7 @@
                 <a:latin typeface="Calibri" panose="020F0502020204030204" pitchFamily="34" charset="0"/>
                 <a:cs typeface="Calibri" panose="020F0502020204030204" pitchFamily="34" charset="0"/>
               </a:rPr>
-              <a:t>Used pickle to save our model down into a callable sav file </a:t>
+              <a:t>Used pickle to save our model down into a callable (.sav) file </a:t>
             </a:r>
             <a:endParaRPr lang="en-US" i="0" dirty="0">
               <a:latin typeface="Calibri" panose="020F0502020204030204" pitchFamily="34" charset="0"/>
@@ -12388,7 +12402,7 @@
         <p:spPr>
           <a:xfrm>
             <a:off x="1028700" y="3682019"/>
-            <a:ext cx="7518350" cy="2246769"/>
+            <a:ext cx="7518350" cy="1323439"/>
           </a:xfrm>
           <a:prstGeom prst="rect">
             <a:avLst/>
@@ -12659,61 +12673,6 @@
               </a:rPr>
               <a:t>Includes the home page, imbedded tableau visualization, and site for users to submit data and receive a prediction on wine quality.</a:t>
             </a:r>
-          </a:p>
-          <a:p>
-            <a:pPr defTabSz="914400">
-              <a:lnSpc>
-                <a:spcPct val="100000"/>
-              </a:lnSpc>
-              <a:spcBef>
-                <a:spcPts val="0"/>
-              </a:spcBef>
-              <a:spcAft>
-                <a:spcPts val="0"/>
-              </a:spcAft>
-            </a:pPr>
-            <a:endParaRPr lang="en-US" dirty="0">
-              <a:latin typeface="Calibri" panose="020F0502020204030204" pitchFamily="34" charset="0"/>
-              <a:cs typeface="Calibri" panose="020F0502020204030204" pitchFamily="34" charset="0"/>
-            </a:endParaRPr>
-          </a:p>
-          <a:p>
-            <a:pPr defTabSz="914400">
-              <a:lnSpc>
-                <a:spcPct val="100000"/>
-              </a:lnSpc>
-              <a:spcBef>
-                <a:spcPts val="0"/>
-              </a:spcBef>
-              <a:spcAft>
-                <a:spcPts val="0"/>
-              </a:spcAft>
-            </a:pPr>
-            <a:r>
-              <a:rPr lang="en-US" dirty="0">
-                <a:latin typeface="Calibri" panose="020F0502020204030204" pitchFamily="34" charset="0"/>
-                <a:ea typeface="Arial" panose="020B0604020202020204" pitchFamily="34" charset="0"/>
-              </a:rPr>
-              <a:t>The route </a:t>
-            </a:r>
-            <a:r>
-              <a:rPr lang="en-US" dirty="0" err="1">
-                <a:latin typeface="Calibri" panose="020F0502020204030204" pitchFamily="34" charset="0"/>
-                <a:ea typeface="Arial" panose="020B0604020202020204" pitchFamily="34" charset="0"/>
-              </a:rPr>
-              <a:t>doShit</a:t>
-            </a:r>
-            <a:r>
-              <a:rPr lang="en-US" dirty="0">
-                <a:latin typeface="Calibri" panose="020F0502020204030204" pitchFamily="34" charset="0"/>
-                <a:ea typeface="Arial" panose="020B0604020202020204" pitchFamily="34" charset="0"/>
-              </a:rPr>
-              <a:t>() retrieves the input from the user, and runs the prediction with the ML.</a:t>
-            </a:r>
-            <a:endParaRPr lang="en-US" dirty="0">
-              <a:latin typeface="Arial" panose="020B0604020202020204" pitchFamily="34" charset="0"/>
-              <a:ea typeface="Arial" panose="020B0604020202020204" pitchFamily="34" charset="0"/>
-            </a:endParaRPr>
           </a:p>
         </p:txBody>
       </p:sp>

</xml_diff>